<commit_message>
Update session 29 documents.
</commit_message>
<xml_diff>
--- a/CPSC-24700/Presentations/session-29.pptx
+++ b/CPSC-24700/Presentations/session-29.pptx
@@ -121,6 +121,10 @@
 </p:presentation>
 </file>
 
+<file path=ppt/revisionInfo.xml><?xml version="1.0" encoding="utf-8"?>
+<p1510:revInfo xmlns:a="http://schemas.openxmlformats.org/drawingml/2006/main" xmlns:r="http://schemas.openxmlformats.org/officeDocument/2006/relationships" xmlns:p1510="http://schemas.microsoft.com/office/powerpoint/2015/10/main"/>
+</file>
+
 <file path=ppt/notesMasters/notesMaster1.xml><?xml version="1.0" encoding="utf-8"?>
 <p:notesMaster xmlns:a="http://schemas.openxmlformats.org/drawingml/2006/main" xmlns:r="http://schemas.openxmlformats.org/officeDocument/2006/relationships" xmlns:p="http://schemas.openxmlformats.org/presentationml/2006/main">
   <p:cSld>
@@ -690,7 +694,10 @@
           <a:bodyPr/>
           <a:lstStyle/>
           <a:p>
-            <a:endParaRPr lang="en-US" sz="1000" dirty="0"/>
+            <a:r>
+              <a:rPr lang="en-US" sz="1000" dirty="0"/>
+              <a:t>Slide are available. </a:t>
+            </a:r>
           </a:p>
         </p:txBody>
       </p:sp>
@@ -4367,7 +4374,7 @@
             </a:pPr>
             <a:r>
               <a:rPr lang="en-US" sz="2000" dirty="0"/>
-              <a:t>Friendly Conversation &amp; Good Natured Banter… Start, Stop, Continue</a:t>
+              <a:t>Friendly Conversation &amp; Good Natured Banter… Start, Stop, Continue preparation</a:t>
             </a:r>
           </a:p>
           <a:p>
@@ -4389,6 +4396,21 @@
               <a:rPr lang="en-US" sz="2000" dirty="0"/>
               <a:t>PHP</a:t>
             </a:r>
+          </a:p>
+          <a:p>
+            <a:pPr marL="457200" indent="-457200">
+              <a:buFont typeface="+mj-lt"/>
+              <a:buAutoNum type="arabicPeriod"/>
+            </a:pPr>
+            <a:r>
+              <a:rPr lang="en-US" sz="2000" dirty="0"/>
+              <a:t>Start, Stop</a:t>
+            </a:r>
+            <a:r>
+              <a:rPr lang="en-US" sz="2000"/>
+              <a:t>, Continue</a:t>
+            </a:r>
+            <a:endParaRPr lang="en-US" sz="2000" dirty="0"/>
           </a:p>
           <a:p>
             <a:pPr marL="457200" indent="-457200">
@@ -4784,13 +4806,8 @@
           <a:p>
             <a:r>
               <a:rPr lang="en-US" sz="2000" dirty="0"/>
-              <a:t>Focus on Project 4… complete Ch.9.5 through 9.6 on PHP </a:t>
-            </a:r>
-            <a:r>
-              <a:rPr lang="en-US" sz="2000"/>
-              <a:t>as time allows</a:t>
-            </a:r>
-            <a:endParaRPr lang="en-US" sz="2000" dirty="0"/>
+              <a:t>Email me a Start, Stop, Continue email to ‘epogue@epogue.com’</a:t>
+            </a:r>
           </a:p>
           <a:p>
             <a:endParaRPr lang="en-US" sz="2000" dirty="0"/>

</xml_diff>

<commit_message>
Add contact-manager-lite.zip and update session 29 documents.
</commit_message>
<xml_diff>
--- a/CPSC-24700/Presentations/session-29.pptx
+++ b/CPSC-24700/Presentations/session-29.pptx
@@ -4374,7 +4374,21 @@
             </a:pPr>
             <a:r>
               <a:rPr lang="en-US" sz="2000" dirty="0"/>
-              <a:t>Friendly Conversation &amp; Good Natured Banter… Start, Stop, Continue preparation</a:t>
+              <a:t>Friendly Conversation &amp; Good Natured Banter</a:t>
+            </a:r>
+          </a:p>
+          <a:p>
+            <a:pPr lvl="1"/>
+            <a:r>
+              <a:rPr lang="en-US" sz="1600" dirty="0"/>
+              <a:t>Start, Stop, Continue preparation</a:t>
+            </a:r>
+          </a:p>
+          <a:p>
+            <a:pPr lvl="1"/>
+            <a:r>
+              <a:rPr lang="en-US" sz="1600" dirty="0"/>
+              <a:t>How are we feeling about our Contact Manager (client) assignment</a:t>
             </a:r>
           </a:p>
           <a:p>
@@ -4404,13 +4418,8 @@
             </a:pPr>
             <a:r>
               <a:rPr lang="en-US" sz="2000" dirty="0"/>
-              <a:t>Start, Stop</a:t>
-            </a:r>
-            <a:r>
-              <a:rPr lang="en-US" sz="2000"/>
-              <a:t>, Continue</a:t>
-            </a:r>
-            <a:endParaRPr lang="en-US" sz="2000" dirty="0"/>
+              <a:t>Today’s Assignment</a:t>
+            </a:r>
           </a:p>
           <a:p>
             <a:pPr marL="457200" indent="-457200">
@@ -4419,17 +4428,7 @@
             </a:pPr>
             <a:r>
               <a:rPr lang="en-US" sz="2000" dirty="0"/>
-              <a:t>Today’s Assignment</a:t>
-            </a:r>
-          </a:p>
-          <a:p>
-            <a:pPr marL="457200" indent="-457200">
-              <a:buFont typeface="+mj-lt"/>
-              <a:buAutoNum type="arabicPeriod"/>
-            </a:pPr>
-            <a:r>
-              <a:rPr lang="en-US" sz="2000" dirty="0"/>
-              <a:t>Project 4: Contact Manager</a:t>
+              <a:t>Week 10 Lab: Contact Manager Lite</a:t>
             </a:r>
           </a:p>
           <a:p>
@@ -4676,7 +4675,7 @@
         <p:spPr>
           <a:xfrm>
             <a:off x="1524000" y="1122362"/>
-            <a:ext cx="9144000" cy="2904029"/>
+            <a:ext cx="9144000" cy="2690881"/>
           </a:xfrm>
         </p:spPr>
         <p:txBody>
@@ -4806,7 +4805,7 @@
           <a:p>
             <a:r>
               <a:rPr lang="en-US" sz="2000" dirty="0"/>
-              <a:t>Email me a Start, Stop, Continue email to ‘epogue@epogue.com’</a:t>
+              <a:t>Email me your Start, Stop, Continue suggestions email to ‘epogue@epogue.com’… by the end of the day Thursday</a:t>
             </a:r>
           </a:p>
           <a:p>
@@ -4877,14 +4876,14 @@
             </a:br>
             <a:r>
               <a:rPr lang="en-US" sz="4800" dirty="0"/>
-              <a:t>Project 4: </a:t>
+              <a:t>Week 10 Lab: </a:t>
             </a:r>
             <a:br>
               <a:rPr lang="en-US" sz="4800" dirty="0"/>
             </a:br>
             <a:r>
               <a:rPr lang="en-US" sz="4800" dirty="0"/>
-              <a:t>Contact Manager</a:t>
+              <a:t>Contact Manager Lite</a:t>
             </a:r>
           </a:p>
         </p:txBody>

</xml_diff>